<commit_message>
Revert "Revert "final ppt""
This reverts commit aba0a64dd270eb5259865372702779d6dfecffd0.
</commit_message>
<xml_diff>
--- a/EPID600_mishra.pptx
+++ b/EPID600_mishra.pptx
@@ -210,7 +210,7 @@
           <a:p>
             <a:fld id="{5D51E038-4AB6-7340-812D-873C78453550}" type="datetimeFigureOut">
               <a:rPr lang="en-US" smtClean="0"/>
-              <a:t>11/28/15</a:t>
+              <a:t>12/7/15</a:t>
             </a:fld>
             <a:endParaRPr lang="en-US"/>
           </a:p>
@@ -910,11 +910,7 @@
           <a:p>
             <a:r>
               <a:rPr lang="en-US" baseline="0" dirty="0" smtClean="0"/>
-              <a:t>Filter 2: </a:t>
-            </a:r>
-            <a:r>
-              <a:rPr lang="en-US" baseline="0" dirty="0" smtClean="0"/>
-              <a:t>: </a:t>
+              <a:t>Filter 2: : </a:t>
             </a:r>
             <a:r>
               <a:rPr lang="en-US" baseline="0" dirty="0" err="1" smtClean="0"/>
@@ -924,7 +920,6 @@
               <a:rPr lang="en-US" baseline="0" dirty="0" smtClean="0"/>
               <a:t> association test first</a:t>
             </a:r>
-            <a:endParaRPr lang="en-US" baseline="0" dirty="0" smtClean="0"/>
           </a:p>
           <a:p>
             <a:endParaRPr lang="en-US" baseline="0" dirty="0" smtClean="0"/>
@@ -2190,7 +2185,7 @@
           <a:p>
             <a:fld id="{9E016143-E03C-4CFD-AFDC-14E5BDEA754C}" type="datetimeFigureOut">
               <a:rPr lang="en-US" dirty="0"/>
-              <a:t>11/24/15</a:t>
+              <a:t>12/7/15</a:t>
             </a:fld>
             <a:endParaRPr lang="en-US" dirty="0"/>
           </a:p>
@@ -2414,7 +2409,7 @@
           <a:p>
             <a:fld id="{C033E54A-A8CA-48C1-9504-691B58049D29}" type="datetimeFigureOut">
               <a:rPr lang="en-US" dirty="0"/>
-              <a:t>11/24/15</a:t>
+              <a:t>12/7/15</a:t>
             </a:fld>
             <a:endParaRPr lang="en-US" dirty="0"/>
           </a:p>
@@ -2589,7 +2584,7 @@
           <a:p>
             <a:fld id="{B5F6C806-BBF7-471C-9527-881CE2266695}" type="datetimeFigureOut">
               <a:rPr lang="en-US" dirty="0"/>
-              <a:t>11/24/15</a:t>
+              <a:t>12/7/15</a:t>
             </a:fld>
             <a:endParaRPr lang="en-US" dirty="0"/>
           </a:p>
@@ -2754,7 +2749,7 @@
           <a:p>
             <a:fld id="{78C94063-DF36-4330-A365-08DA1FA5B7D6}" type="datetimeFigureOut">
               <a:rPr lang="en-US" dirty="0"/>
-              <a:t>11/24/15</a:t>
+              <a:t>12/7/15</a:t>
             </a:fld>
             <a:endParaRPr lang="en-US" dirty="0"/>
           </a:p>
@@ -3003,7 +2998,7 @@
           <a:p>
             <a:fld id="{908A7C6C-0F39-4D70-8E8D-FE5B9C95FA73}" type="datetimeFigureOut">
               <a:rPr lang="en-US" dirty="0"/>
-              <a:t>11/24/15</a:t>
+              <a:t>12/7/15</a:t>
             </a:fld>
             <a:endParaRPr lang="en-US" dirty="0"/>
           </a:p>
@@ -3324,7 +3319,7 @@
           <a:p>
             <a:fld id="{DFCFA4AC-08CC-42CE-BD01-C191750A04EC}" type="datetimeFigureOut">
               <a:rPr lang="en-US" dirty="0"/>
-              <a:t>11/24/15</a:t>
+              <a:t>12/7/15</a:t>
             </a:fld>
             <a:endParaRPr lang="en-US" dirty="0"/>
           </a:p>
@@ -3770,7 +3765,7 @@
           <a:p>
             <a:fld id="{1BA7A723-92A7-435B-B681-F25B092FEFEB}" type="datetimeFigureOut">
               <a:rPr lang="en-US" dirty="0"/>
-              <a:t>11/24/15</a:t>
+              <a:t>12/7/15</a:t>
             </a:fld>
             <a:endParaRPr lang="en-US" dirty="0"/>
           </a:p>
@@ -3883,7 +3878,7 @@
           <a:p>
             <a:fld id="{4F170639-886C-4FCF-9EAB-ABB5DA3F3F4A}" type="datetimeFigureOut">
               <a:rPr lang="en-US" dirty="0"/>
-              <a:t>11/24/15</a:t>
+              <a:t>12/7/15</a:t>
             </a:fld>
             <a:endParaRPr lang="en-US" dirty="0"/>
           </a:p>
@@ -3973,7 +3968,7 @@
           <a:p>
             <a:fld id="{22230651-31F4-45D2-98AE-A2108F41BC07}" type="datetimeFigureOut">
               <a:rPr lang="en-US" dirty="0"/>
-              <a:t>11/24/15</a:t>
+              <a:t>12/7/15</a:t>
             </a:fld>
             <a:endParaRPr lang="en-US" dirty="0"/>
           </a:p>
@@ -4255,7 +4250,7 @@
           <a:p>
             <a:fld id="{6F53789A-C914-4DB1-8815-80B5EC7335C5}" type="datetimeFigureOut">
               <a:rPr lang="en-US" dirty="0"/>
-              <a:t>11/24/15</a:t>
+              <a:t>12/7/15</a:t>
             </a:fld>
             <a:endParaRPr lang="en-US" dirty="0"/>
           </a:p>
@@ -4575,7 +4570,7 @@
           <a:p>
             <a:fld id="{5E6440AA-91A0-436F-8FDB-C0F939DCAE21}" type="datetimeFigureOut">
               <a:rPr lang="en-US" dirty="0"/>
-              <a:t>11/24/15</a:t>
+              <a:t>12/7/15</a:t>
             </a:fld>
             <a:endParaRPr lang="en-US" dirty="0"/>
           </a:p>
@@ -4824,7 +4819,7 @@
           <a:p>
             <a:fld id="{0E59FD0C-5451-4CA0-86AF-E70AE3279989}" type="datetimeFigureOut">
               <a:rPr lang="en-US" dirty="0"/>
-              <a:t>11/24/15</a:t>
+              <a:t>12/7/15</a:t>
             </a:fld>
             <a:endParaRPr lang="en-US" dirty="0"/>
           </a:p>
@@ -5326,11 +5321,7 @@
           <a:p>
             <a:r>
               <a:rPr lang="en-US" dirty="0" smtClean="0"/>
-              <a:t>Predicting warfarin </a:t>
-            </a:r>
-            <a:r>
-              <a:rPr lang="en-US" dirty="0" smtClean="0"/>
-              <a:t>dosage from clinical and </a:t>
+              <a:t>Predicting warfarin dosage from clinical and </a:t>
             </a:r>
             <a:r>
               <a:rPr lang="en-US" dirty="0" err="1" smtClean="0"/>
@@ -6259,7 +6250,6 @@
               <a:rPr lang="en-US" sz="2400" dirty="0" smtClean="0"/>
               <a:t>Warfarin is an anticoagulant drug</a:t>
             </a:r>
-            <a:endParaRPr lang="en-US" sz="2400" dirty="0" smtClean="0"/>
           </a:p>
           <a:p>
             <a:r>
@@ -6281,11 +6271,7 @@
             </a:r>
             <a:r>
               <a:rPr lang="en-US" sz="2600" dirty="0" smtClean="0"/>
-              <a:t> </a:t>
-            </a:r>
-            <a:r>
-              <a:rPr lang="en-US" sz="2600" dirty="0" smtClean="0"/>
-              <a:t>Data</a:t>
+              <a:t> Data</a:t>
             </a:r>
             <a:endParaRPr lang="en-US" sz="2200" dirty="0" smtClean="0"/>
           </a:p>
@@ -7250,7 +7236,6 @@
               <a:rPr lang="en-US" dirty="0"/>
               <a:t>Association Tests</a:t>
             </a:r>
-            <a:endParaRPr lang="en-US" dirty="0"/>
           </a:p>
         </p:txBody>
       </p:sp>

</xml_diff>